<commit_message>
Corrections diverses + exemples Cours 2 SQL et Cours 3 C#
</commit_message>
<xml_diff>
--- a/C#/Cours 3/Introduction au développement Web en ASP - 3.pptx
+++ b/C#/Cours 3/Introduction au développement Web en ASP - 3.pptx
@@ -5,10 +5,10 @@
     <p:sldMasterId id="2147483711" r:id="rId1"/>
   </p:sldMasterIdLst>
   <p:notesMasterIdLst>
-    <p:notesMasterId r:id="rId17"/>
+    <p:notesMasterId r:id="rId19"/>
   </p:notesMasterIdLst>
   <p:handoutMasterIdLst>
-    <p:handoutMasterId r:id="rId18"/>
+    <p:handoutMasterId r:id="rId20"/>
   </p:handoutMasterIdLst>
   <p:sldIdLst>
     <p:sldId id="256" r:id="rId2"/>
@@ -25,7 +25,9 @@
     <p:sldId id="272" r:id="rId13"/>
     <p:sldId id="273" r:id="rId14"/>
     <p:sldId id="274" r:id="rId15"/>
-    <p:sldId id="275" r:id="rId16"/>
+    <p:sldId id="276" r:id="rId16"/>
+    <p:sldId id="275" r:id="rId17"/>
+    <p:sldId id="277" r:id="rId18"/>
   </p:sldIdLst>
   <p:sldSz cx="12192000" cy="6858000"/>
   <p:notesSz cx="6858000" cy="9945688"/>
@@ -760,6 +762,90 @@
 </p:notes>
 </file>
 
+<file path=ppt/notesSlides/notesSlide2.xml><?xml version="1.0" encoding="utf-8"?>
+<p:notes xmlns:a="http://schemas.openxmlformats.org/drawingml/2006/main" xmlns:r="http://schemas.openxmlformats.org/officeDocument/2006/relationships" xmlns:p="http://schemas.openxmlformats.org/presentationml/2006/main">
+  <p:cSld>
+    <p:spTree>
+      <p:nvGrpSpPr>
+        <p:cNvPr id="1" name=""/>
+        <p:cNvGrpSpPr/>
+        <p:nvPr/>
+      </p:nvGrpSpPr>
+      <p:grpSpPr>
+        <a:xfrm>
+          <a:off x="0" y="0"/>
+          <a:ext cx="0" cy="0"/>
+          <a:chOff x="0" y="0"/>
+          <a:chExt cx="0" cy="0"/>
+        </a:xfrm>
+      </p:grpSpPr>
+      <p:sp>
+        <p:nvSpPr>
+          <p:cNvPr id="2" name="Espace réservé de l'image des diapositives 1"/>
+          <p:cNvSpPr>
+            <a:spLocks noGrp="1" noRot="1" noChangeAspect="1"/>
+          </p:cNvSpPr>
+          <p:nvPr>
+            <p:ph type="sldImg"/>
+          </p:nvPr>
+        </p:nvSpPr>
+        <p:spPr/>
+      </p:sp>
+      <p:sp>
+        <p:nvSpPr>
+          <p:cNvPr id="3" name="Espace réservé des notes 2"/>
+          <p:cNvSpPr>
+            <a:spLocks noGrp="1"/>
+          </p:cNvSpPr>
+          <p:nvPr>
+            <p:ph type="body" idx="1"/>
+          </p:nvPr>
+        </p:nvSpPr>
+        <p:spPr/>
+        <p:txBody>
+          <a:bodyPr/>
+          <a:lstStyle/>
+          <a:p>
+            <a:endParaRPr lang="fr-FR" dirty="0"/>
+          </a:p>
+        </p:txBody>
+      </p:sp>
+      <p:sp>
+        <p:nvSpPr>
+          <p:cNvPr id="4" name="Espace réservé du numéro de diapositive 3"/>
+          <p:cNvSpPr>
+            <a:spLocks noGrp="1"/>
+          </p:cNvSpPr>
+          <p:nvPr>
+            <p:ph type="sldNum" sz="quarter" idx="10"/>
+          </p:nvPr>
+        </p:nvSpPr>
+        <p:spPr/>
+        <p:txBody>
+          <a:bodyPr/>
+          <a:lstStyle/>
+          <a:p>
+            <a:fld id="{59CA2540-CDB7-405E-84A0-C4C96EE09C34}" type="slidenum">
+              <a:rPr lang="fr-FR" smtClean="0"/>
+              <a:t>17</a:t>
+            </a:fld>
+            <a:endParaRPr lang="fr-FR"/>
+          </a:p>
+        </p:txBody>
+      </p:sp>
+    </p:spTree>
+    <p:extLst>
+      <p:ext uri="{BB962C8B-B14F-4D97-AF65-F5344CB8AC3E}">
+        <p14:creationId xmlns:p14="http://schemas.microsoft.com/office/powerpoint/2010/main" val="907541763"/>
+      </p:ext>
+    </p:extLst>
+  </p:cSld>
+  <p:clrMapOvr>
+    <a:masterClrMapping/>
+  </p:clrMapOvr>
+</p:notes>
+</file>
+
 <file path=ppt/slideLayouts/slideLayout1.xml><?xml version="1.0" encoding="utf-8"?>
 <p:sldLayout xmlns:a="http://schemas.openxmlformats.org/drawingml/2006/main" xmlns:r="http://schemas.openxmlformats.org/officeDocument/2006/relationships" xmlns:p="http://schemas.openxmlformats.org/presentationml/2006/main" type="title" preserve="1">
   <p:cSld name="Diapositive de titre">
@@ -855,7 +941,7 @@
           <a:effectLst/>
           <a:extLst>
             <a:ext uri="{91240B29-F687-4f45-9708-019B960494DF}">
-              <a14:hiddenLine xmlns="" xmlns:a14="http://schemas.microsoft.com/office/drawing/2010/main" w="9525">
+              <a14:hiddenLine xmlns:a14="http://schemas.microsoft.com/office/drawing/2010/main" xmlns="" w="9525">
                 <a:solidFill>
                   <a:srgbClr val="000000"/>
                 </a:solidFill>
@@ -2377,7 +2463,7 @@
           <a:ln/>
           <a:extLst>
             <a:ext uri="{91240B29-F687-4f45-9708-019B960494DF}">
-              <a14:hiddenLine xmlns="" xmlns:a14="http://schemas.microsoft.com/office/drawing/2010/main" w="9525">
+              <a14:hiddenLine xmlns:a14="http://schemas.microsoft.com/office/drawing/2010/main" xmlns="" w="9525">
                 <a:solidFill>
                   <a:srgbClr val="000000"/>
                 </a:solidFill>
@@ -2652,7 +2738,7 @@
           <a:ln/>
           <a:extLst>
             <a:ext uri="{91240B29-F687-4f45-9708-019B960494DF}">
-              <a14:hiddenLine xmlns="" xmlns:a14="http://schemas.microsoft.com/office/drawing/2010/main" w="9525">
+              <a14:hiddenLine xmlns:a14="http://schemas.microsoft.com/office/drawing/2010/main" xmlns="" w="9525">
                 <a:solidFill>
                   <a:srgbClr val="000000"/>
                 </a:solidFill>
@@ -2935,7 +3021,7 @@
           <a:ln/>
           <a:extLst>
             <a:ext uri="{91240B29-F687-4f45-9708-019B960494DF}">
-              <a14:hiddenLine xmlns="" xmlns:a14="http://schemas.microsoft.com/office/drawing/2010/main" w="9525">
+              <a14:hiddenLine xmlns:a14="http://schemas.microsoft.com/office/drawing/2010/main" xmlns="" w="9525">
                 <a:solidFill>
                   <a:srgbClr val="000000"/>
                 </a:solidFill>
@@ -3524,7 +3610,7 @@
           <a:ln/>
           <a:extLst>
             <a:ext uri="{91240B29-F687-4f45-9708-019B960494DF}">
-              <a14:hiddenLine xmlns="" xmlns:a14="http://schemas.microsoft.com/office/drawing/2010/main" w="9525">
+              <a14:hiddenLine xmlns:a14="http://schemas.microsoft.com/office/drawing/2010/main" xmlns="" w="9525">
                 <a:solidFill>
                   <a:srgbClr val="000000"/>
                 </a:solidFill>
@@ -3863,7 +3949,7 @@
           <a:ln/>
           <a:extLst>
             <a:ext uri="{91240B29-F687-4f45-9708-019B960494DF}">
-              <a14:hiddenLine xmlns="" xmlns:a14="http://schemas.microsoft.com/office/drawing/2010/main" w="9525">
+              <a14:hiddenLine xmlns:a14="http://schemas.microsoft.com/office/drawing/2010/main" xmlns="" w="9525">
                 <a:solidFill>
                   <a:srgbClr val="000000"/>
                 </a:solidFill>
@@ -4340,7 +4426,7 @@
           <a:ln/>
           <a:extLst>
             <a:ext uri="{91240B29-F687-4f45-9708-019B960494DF}">
-              <a14:hiddenLine xmlns="" xmlns:a14="http://schemas.microsoft.com/office/drawing/2010/main" w="9525">
+              <a14:hiddenLine xmlns:a14="http://schemas.microsoft.com/office/drawing/2010/main" xmlns="" w="9525">
                 <a:solidFill>
                   <a:srgbClr val="000000"/>
                 </a:solidFill>
@@ -4769,7 +4855,7 @@
           <a:ln/>
           <a:extLst>
             <a:ext uri="{91240B29-F687-4f45-9708-019B960494DF}">
-              <a14:hiddenLine xmlns="" xmlns:a14="http://schemas.microsoft.com/office/drawing/2010/main" w="9525">
+              <a14:hiddenLine xmlns:a14="http://schemas.microsoft.com/office/drawing/2010/main" xmlns="" w="9525">
                 <a:solidFill>
                   <a:srgbClr val="000000"/>
                 </a:solidFill>
@@ -9598,442 +9684,8 @@
               <a:t>fichiers</a:t>
             </a:r>
             <a:r>
-              <a:rPr lang="en-US" sz="1800" b="0" kern="1200" dirty="0">
-                <a:solidFill>
-                  <a:schemeClr val="tx1"/>
-                </a:solidFill>
-                <a:effectLst/>
-                <a:latin typeface="+mn-lt"/>
-                <a:ea typeface="+mn-ea"/>
-                <a:cs typeface="+mn-cs"/>
-              </a:rPr>
+              <a:rPr lang="en-US" dirty="0"/>
               <a:t>.</a:t>
-            </a:r>
-            <a:endParaRPr lang="fr-FR" dirty="0">
-              <a:effectLst/>
-            </a:endParaRPr>
-          </a:p>
-          <a:p>
-            <a:pPr lvl="1" rtl="0" eaLnBrk="1" latinLnBrk="0" hangingPunct="1"/>
-            <a:r>
-              <a:rPr lang="en-US" sz="1600" b="0" kern="1200" dirty="0">
-                <a:solidFill>
-                  <a:schemeClr val="tx1"/>
-                </a:solidFill>
-                <a:effectLst/>
-                <a:latin typeface="+mn-lt"/>
-                <a:ea typeface="+mn-ea"/>
-                <a:cs typeface="+mn-cs"/>
-              </a:rPr>
-              <a:t>Par convention, on </a:t>
-            </a:r>
-            <a:r>
-              <a:rPr lang="en-US" sz="1600" b="0" kern="1200" dirty="0" err="1">
-                <a:solidFill>
-                  <a:schemeClr val="tx1"/>
-                </a:solidFill>
-                <a:effectLst/>
-                <a:latin typeface="+mn-lt"/>
-                <a:ea typeface="+mn-ea"/>
-                <a:cs typeface="+mn-cs"/>
-              </a:rPr>
-              <a:t>créé</a:t>
-            </a:r>
-            <a:r>
-              <a:rPr lang="en-US" sz="1600" b="0" kern="1200" dirty="0">
-                <a:solidFill>
-                  <a:schemeClr val="tx1"/>
-                </a:solidFill>
-                <a:effectLst/>
-                <a:latin typeface="+mn-lt"/>
-                <a:ea typeface="+mn-ea"/>
-                <a:cs typeface="+mn-cs"/>
-              </a:rPr>
-              <a:t> un sous namespace par sous-dossier physique, </a:t>
-            </a:r>
-            <a:r>
-              <a:rPr lang="en-US" sz="1600" b="0" kern="1200" dirty="0" err="1">
-                <a:solidFill>
-                  <a:schemeClr val="tx1"/>
-                </a:solidFill>
-                <a:effectLst/>
-                <a:latin typeface="+mn-lt"/>
-                <a:ea typeface="+mn-ea"/>
-                <a:cs typeface="+mn-cs"/>
-              </a:rPr>
-              <a:t>mais</a:t>
-            </a:r>
-            <a:r>
-              <a:rPr lang="en-US" sz="1600" b="0" kern="1200" dirty="0">
-                <a:solidFill>
-                  <a:schemeClr val="tx1"/>
-                </a:solidFill>
-                <a:effectLst/>
-                <a:latin typeface="+mn-lt"/>
-                <a:ea typeface="+mn-ea"/>
-                <a:cs typeface="+mn-cs"/>
-              </a:rPr>
-              <a:t> </a:t>
-            </a:r>
-            <a:r>
-              <a:rPr lang="en-US" sz="1600" b="0" kern="1200" dirty="0" err="1">
-                <a:solidFill>
-                  <a:schemeClr val="tx1"/>
-                </a:solidFill>
-                <a:effectLst/>
-                <a:latin typeface="+mn-lt"/>
-                <a:ea typeface="+mn-ea"/>
-                <a:cs typeface="+mn-cs"/>
-              </a:rPr>
-              <a:t>ce</a:t>
-            </a:r>
-            <a:r>
-              <a:rPr lang="en-US" sz="1600" b="0" kern="1200" dirty="0">
-                <a:solidFill>
-                  <a:schemeClr val="tx1"/>
-                </a:solidFill>
-                <a:effectLst/>
-                <a:latin typeface="+mn-lt"/>
-                <a:ea typeface="+mn-ea"/>
-                <a:cs typeface="+mn-cs"/>
-              </a:rPr>
-              <a:t> </a:t>
-            </a:r>
-            <a:r>
-              <a:rPr lang="en-US" sz="1600" b="0" kern="1200" dirty="0" err="1">
-                <a:solidFill>
-                  <a:schemeClr val="tx1"/>
-                </a:solidFill>
-                <a:effectLst/>
-                <a:latin typeface="+mn-lt"/>
-                <a:ea typeface="+mn-ea"/>
-                <a:cs typeface="+mn-cs"/>
-              </a:rPr>
-              <a:t>n’est</a:t>
-            </a:r>
-            <a:r>
-              <a:rPr lang="en-US" sz="1600" b="0" kern="1200" dirty="0">
-                <a:solidFill>
-                  <a:schemeClr val="tx1"/>
-                </a:solidFill>
-                <a:effectLst/>
-                <a:latin typeface="+mn-lt"/>
-                <a:ea typeface="+mn-ea"/>
-                <a:cs typeface="+mn-cs"/>
-              </a:rPr>
-              <a:t> pas </a:t>
-            </a:r>
-            <a:r>
-              <a:rPr lang="en-US" sz="1600" b="0" kern="1200" dirty="0" err="1">
-                <a:solidFill>
-                  <a:schemeClr val="tx1"/>
-                </a:solidFill>
-                <a:effectLst/>
-                <a:latin typeface="+mn-lt"/>
-                <a:ea typeface="+mn-ea"/>
-                <a:cs typeface="+mn-cs"/>
-              </a:rPr>
-              <a:t>obligatoire</a:t>
-            </a:r>
-            <a:r>
-              <a:rPr lang="en-US" sz="1600" b="0" kern="1200" dirty="0">
-                <a:solidFill>
-                  <a:schemeClr val="tx1"/>
-                </a:solidFill>
-                <a:effectLst/>
-                <a:latin typeface="+mn-lt"/>
-                <a:ea typeface="+mn-ea"/>
-                <a:cs typeface="+mn-cs"/>
-              </a:rPr>
-              <a:t> </a:t>
-            </a:r>
-            <a:r>
-              <a:rPr lang="en-US" sz="1600" b="0" kern="1200" dirty="0" err="1">
-                <a:solidFill>
-                  <a:schemeClr val="tx1"/>
-                </a:solidFill>
-                <a:effectLst/>
-                <a:latin typeface="+mn-lt"/>
-                <a:ea typeface="+mn-ea"/>
-                <a:cs typeface="+mn-cs"/>
-              </a:rPr>
-              <a:t>ni</a:t>
-            </a:r>
-            <a:r>
-              <a:rPr lang="en-US" sz="1600" b="0" kern="1200" dirty="0">
-                <a:solidFill>
-                  <a:schemeClr val="tx1"/>
-                </a:solidFill>
-                <a:effectLst/>
-                <a:latin typeface="+mn-lt"/>
-                <a:ea typeface="+mn-ea"/>
-                <a:cs typeface="+mn-cs"/>
-              </a:rPr>
-              <a:t> </a:t>
-            </a:r>
-            <a:r>
-              <a:rPr lang="en-US" sz="1600" b="0" kern="1200" dirty="0" err="1">
-                <a:solidFill>
-                  <a:schemeClr val="tx1"/>
-                </a:solidFill>
-                <a:effectLst/>
-                <a:latin typeface="+mn-lt"/>
-                <a:ea typeface="+mn-ea"/>
-                <a:cs typeface="+mn-cs"/>
-              </a:rPr>
-              <a:t>imposé</a:t>
-            </a:r>
-            <a:endParaRPr lang="fr-FR" dirty="0">
-              <a:effectLst/>
-            </a:endParaRPr>
-          </a:p>
-          <a:p>
-            <a:pPr rtl="0" eaLnBrk="1" latinLnBrk="0" hangingPunct="1"/>
-            <a:r>
-              <a:rPr lang="en-US" sz="1800" b="0" kern="1200" dirty="0">
-                <a:solidFill>
-                  <a:schemeClr val="tx1"/>
-                </a:solidFill>
-                <a:effectLst/>
-                <a:latin typeface="+mn-lt"/>
-                <a:ea typeface="+mn-ea"/>
-                <a:cs typeface="+mn-cs"/>
-              </a:rPr>
-              <a:t>Une </a:t>
-            </a:r>
-            <a:r>
-              <a:rPr lang="en-US" sz="1800" b="0" kern="1200" dirty="0" err="1">
-                <a:solidFill>
-                  <a:schemeClr val="tx1"/>
-                </a:solidFill>
-                <a:effectLst/>
-                <a:latin typeface="+mn-lt"/>
-                <a:ea typeface="+mn-ea"/>
-                <a:cs typeface="+mn-cs"/>
-              </a:rPr>
-              <a:t>classe</a:t>
-            </a:r>
-            <a:r>
-              <a:rPr lang="en-US" sz="1800" b="0" kern="1200" dirty="0">
-                <a:solidFill>
-                  <a:schemeClr val="tx1"/>
-                </a:solidFill>
-                <a:effectLst/>
-                <a:latin typeface="+mn-lt"/>
-                <a:ea typeface="+mn-ea"/>
-                <a:cs typeface="+mn-cs"/>
-              </a:rPr>
-              <a:t> </a:t>
-            </a:r>
-            <a:r>
-              <a:rPr lang="en-US" sz="1800" b="0" kern="1200" dirty="0" err="1">
-                <a:solidFill>
-                  <a:schemeClr val="tx1"/>
-                </a:solidFill>
-                <a:effectLst/>
-                <a:latin typeface="+mn-lt"/>
-                <a:ea typeface="+mn-ea"/>
-                <a:cs typeface="+mn-cs"/>
-              </a:rPr>
-              <a:t>peut-être</a:t>
-            </a:r>
-            <a:r>
-              <a:rPr lang="en-US" sz="1800" b="0" kern="1200" dirty="0">
-                <a:solidFill>
-                  <a:schemeClr val="tx1"/>
-                </a:solidFill>
-                <a:effectLst/>
-                <a:latin typeface="+mn-lt"/>
-                <a:ea typeface="+mn-ea"/>
-                <a:cs typeface="+mn-cs"/>
-              </a:rPr>
-              <a:t> </a:t>
-            </a:r>
-            <a:r>
-              <a:rPr lang="en-US" sz="1800" b="0" kern="1200" dirty="0" err="1">
-                <a:solidFill>
-                  <a:schemeClr val="tx1"/>
-                </a:solidFill>
-                <a:effectLst/>
-                <a:latin typeface="+mn-lt"/>
-                <a:ea typeface="+mn-ea"/>
-                <a:cs typeface="+mn-cs"/>
-              </a:rPr>
-              <a:t>répartie</a:t>
-            </a:r>
-            <a:r>
-              <a:rPr lang="en-US" sz="1800" b="0" kern="1200" dirty="0">
-                <a:solidFill>
-                  <a:schemeClr val="tx1"/>
-                </a:solidFill>
-                <a:effectLst/>
-                <a:latin typeface="+mn-lt"/>
-                <a:ea typeface="+mn-ea"/>
-                <a:cs typeface="+mn-cs"/>
-              </a:rPr>
-              <a:t> sur </a:t>
-            </a:r>
-            <a:r>
-              <a:rPr lang="en-US" sz="1800" b="0" kern="1200" dirty="0" err="1">
-                <a:solidFill>
-                  <a:schemeClr val="tx1"/>
-                </a:solidFill>
-                <a:effectLst/>
-                <a:latin typeface="+mn-lt"/>
-                <a:ea typeface="+mn-ea"/>
-                <a:cs typeface="+mn-cs"/>
-              </a:rPr>
-              <a:t>plusieurs</a:t>
-            </a:r>
-            <a:r>
-              <a:rPr lang="en-US" sz="1800" b="0" kern="1200" dirty="0">
-                <a:solidFill>
-                  <a:schemeClr val="tx1"/>
-                </a:solidFill>
-                <a:effectLst/>
-                <a:latin typeface="+mn-lt"/>
-                <a:ea typeface="+mn-ea"/>
-                <a:cs typeface="+mn-cs"/>
-              </a:rPr>
-              <a:t> </a:t>
-            </a:r>
-            <a:r>
-              <a:rPr lang="en-US" sz="1800" b="0" kern="1200" dirty="0" err="1">
-                <a:solidFill>
-                  <a:schemeClr val="tx1"/>
-                </a:solidFill>
-                <a:effectLst/>
-                <a:latin typeface="+mn-lt"/>
-                <a:ea typeface="+mn-ea"/>
-                <a:cs typeface="+mn-cs"/>
-              </a:rPr>
-              <a:t>fichiers</a:t>
-            </a:r>
-            <a:r>
-              <a:rPr lang="en-US" sz="1800" b="0" kern="1200" dirty="0">
-                <a:solidFill>
-                  <a:schemeClr val="tx1"/>
-                </a:solidFill>
-                <a:effectLst/>
-                <a:latin typeface="+mn-lt"/>
-                <a:ea typeface="+mn-ea"/>
-                <a:cs typeface="+mn-cs"/>
-              </a:rPr>
-              <a:t> à la condition </a:t>
-            </a:r>
-            <a:r>
-              <a:rPr lang="en-US" sz="1800" b="0" kern="1200" dirty="0" err="1">
-                <a:solidFill>
-                  <a:schemeClr val="tx1"/>
-                </a:solidFill>
-                <a:effectLst/>
-                <a:latin typeface="+mn-lt"/>
-                <a:ea typeface="+mn-ea"/>
-                <a:cs typeface="+mn-cs"/>
-              </a:rPr>
-              <a:t>d’utiliser</a:t>
-            </a:r>
-            <a:r>
-              <a:rPr lang="en-US" sz="1800" b="0" kern="1200" dirty="0">
-                <a:solidFill>
-                  <a:schemeClr val="tx1"/>
-                </a:solidFill>
-                <a:effectLst/>
-                <a:latin typeface="+mn-lt"/>
-                <a:ea typeface="+mn-ea"/>
-                <a:cs typeface="+mn-cs"/>
-              </a:rPr>
-              <a:t> le mot </a:t>
-            </a:r>
-            <a:r>
-              <a:rPr lang="en-US" sz="1800" b="0" kern="1200" dirty="0" err="1">
-                <a:solidFill>
-                  <a:schemeClr val="tx1"/>
-                </a:solidFill>
-                <a:effectLst/>
-                <a:latin typeface="+mn-lt"/>
-                <a:ea typeface="+mn-ea"/>
-                <a:cs typeface="+mn-cs"/>
-              </a:rPr>
-              <a:t>clé</a:t>
-            </a:r>
-            <a:r>
-              <a:rPr lang="en-US" sz="1800" b="0" kern="1200" dirty="0">
-                <a:solidFill>
-                  <a:schemeClr val="tx1"/>
-                </a:solidFill>
-                <a:effectLst/>
-                <a:latin typeface="+mn-lt"/>
-                <a:ea typeface="+mn-ea"/>
-                <a:cs typeface="+mn-cs"/>
-              </a:rPr>
-              <a:t> « partial »</a:t>
-            </a:r>
-            <a:endParaRPr lang="fr-FR" dirty="0">
-              <a:effectLst/>
-            </a:endParaRPr>
-          </a:p>
-          <a:p>
-            <a:pPr lvl="1" rtl="0" eaLnBrk="1" latinLnBrk="0" hangingPunct="1"/>
-            <a:r>
-              <a:rPr lang="en-US" sz="1600" b="0" kern="1200" dirty="0" err="1">
-                <a:solidFill>
-                  <a:schemeClr val="tx1"/>
-                </a:solidFill>
-                <a:effectLst/>
-                <a:latin typeface="+mn-lt"/>
-                <a:ea typeface="+mn-ea"/>
-                <a:cs typeface="+mn-cs"/>
-              </a:rPr>
-              <a:t>Très</a:t>
-            </a:r>
-            <a:r>
-              <a:rPr lang="en-US" sz="1600" b="0" kern="1200" dirty="0">
-                <a:solidFill>
-                  <a:schemeClr val="tx1"/>
-                </a:solidFill>
-                <a:effectLst/>
-                <a:latin typeface="+mn-lt"/>
-                <a:ea typeface="+mn-ea"/>
-                <a:cs typeface="+mn-cs"/>
-              </a:rPr>
-              <a:t> </a:t>
-            </a:r>
-            <a:r>
-              <a:rPr lang="en-US" sz="1600" b="0" kern="1200" dirty="0" err="1">
-                <a:solidFill>
-                  <a:schemeClr val="tx1"/>
-                </a:solidFill>
-                <a:effectLst/>
-                <a:latin typeface="+mn-lt"/>
-                <a:ea typeface="+mn-ea"/>
-                <a:cs typeface="+mn-cs"/>
-              </a:rPr>
-              <a:t>rarement</a:t>
-            </a:r>
-            <a:r>
-              <a:rPr lang="en-US" sz="1600" b="0" kern="1200" dirty="0">
-                <a:solidFill>
-                  <a:schemeClr val="tx1"/>
-                </a:solidFill>
-                <a:effectLst/>
-                <a:latin typeface="+mn-lt"/>
-                <a:ea typeface="+mn-ea"/>
-                <a:cs typeface="+mn-cs"/>
-              </a:rPr>
-              <a:t> </a:t>
-            </a:r>
-            <a:r>
-              <a:rPr lang="en-US" sz="1600" b="0" kern="1200" dirty="0" err="1">
-                <a:solidFill>
-                  <a:schemeClr val="tx1"/>
-                </a:solidFill>
-                <a:effectLst/>
-                <a:latin typeface="+mn-lt"/>
-                <a:ea typeface="+mn-ea"/>
-                <a:cs typeface="+mn-cs"/>
-              </a:rPr>
-              <a:t>utilisé</a:t>
             </a:r>
             <a:endParaRPr lang="fr-FR" dirty="0">
               <a:effectLst/>
@@ -10105,6 +9757,246 @@
           <p:cNvPr id="2" name="Titre 1">
             <a:extLst>
               <a:ext uri="{FF2B5EF4-FFF2-40B4-BE49-F238E27FC236}">
+                <a16:creationId xmlns:a16="http://schemas.microsoft.com/office/drawing/2014/main" id="{0E8F7529-0A11-482F-BC36-3E981F5735FA}"/>
+              </a:ext>
+            </a:extLst>
+          </p:cNvPr>
+          <p:cNvSpPr>
+            <a:spLocks noGrp="1"/>
+          </p:cNvSpPr>
+          <p:nvPr>
+            <p:ph type="title"/>
+          </p:nvPr>
+        </p:nvSpPr>
+        <p:spPr/>
+        <p:txBody>
+          <a:bodyPr/>
+          <a:lstStyle/>
+          <a:p>
+            <a:r>
+              <a:rPr lang="fr-FR" dirty="0"/>
+              <a:t>Multi-fichier – Conventions</a:t>
+            </a:r>
+          </a:p>
+        </p:txBody>
+      </p:sp>
+      <p:sp>
+        <p:nvSpPr>
+          <p:cNvPr id="3" name="Espace réservé du contenu 2">
+            <a:extLst>
+              <a:ext uri="{FF2B5EF4-FFF2-40B4-BE49-F238E27FC236}">
+                <a16:creationId xmlns:a16="http://schemas.microsoft.com/office/drawing/2014/main" id="{9B081DD1-5124-48F9-AFBD-9A7718973E8E}"/>
+              </a:ext>
+            </a:extLst>
+          </p:cNvPr>
+          <p:cNvSpPr>
+            <a:spLocks noGrp="1"/>
+          </p:cNvSpPr>
+          <p:nvPr>
+            <p:ph idx="1"/>
+          </p:nvPr>
+        </p:nvSpPr>
+        <p:spPr/>
+        <p:txBody>
+          <a:bodyPr/>
+          <a:lstStyle/>
+          <a:p>
+            <a:r>
+              <a:rPr lang="fr-FR" dirty="0"/>
+              <a:t>Un fichier par classe, le fichier portant le nom de la classe</a:t>
+            </a:r>
+          </a:p>
+          <a:p>
+            <a:pPr lvl="1"/>
+            <a:r>
+              <a:rPr lang="en-US" dirty="0"/>
+              <a:t>Il </a:t>
+            </a:r>
+            <a:r>
+              <a:rPr lang="en-US" dirty="0" err="1"/>
+              <a:t>est</a:t>
+            </a:r>
+            <a:r>
+              <a:rPr lang="en-US" dirty="0"/>
+              <a:t> </a:t>
+            </a:r>
+            <a:r>
+              <a:rPr lang="en-US" dirty="0" err="1"/>
+              <a:t>techniquement</a:t>
+            </a:r>
+            <a:r>
+              <a:rPr lang="en-US" dirty="0"/>
+              <a:t> possible de la </a:t>
+            </a:r>
+            <a:r>
+              <a:rPr lang="en-US" dirty="0" err="1"/>
+              <a:t>répartir</a:t>
+            </a:r>
+            <a:r>
+              <a:rPr lang="en-US" dirty="0"/>
+              <a:t> sur </a:t>
+            </a:r>
+            <a:r>
+              <a:rPr lang="en-US" dirty="0" err="1"/>
+              <a:t>plusieurs</a:t>
+            </a:r>
+            <a:r>
+              <a:rPr lang="en-US" dirty="0"/>
+              <a:t> </a:t>
+            </a:r>
+            <a:r>
+              <a:rPr lang="en-US" dirty="0" err="1"/>
+              <a:t>fichiers</a:t>
+            </a:r>
+            <a:r>
+              <a:rPr lang="en-US" dirty="0"/>
+              <a:t> à la condition </a:t>
+            </a:r>
+            <a:r>
+              <a:rPr lang="en-US" dirty="0" err="1"/>
+              <a:t>d’utiliser</a:t>
+            </a:r>
+            <a:r>
+              <a:rPr lang="en-US" dirty="0"/>
+              <a:t> le mot </a:t>
+            </a:r>
+            <a:r>
+              <a:rPr lang="en-US" dirty="0" err="1"/>
+              <a:t>clé</a:t>
+            </a:r>
+            <a:r>
+              <a:rPr lang="en-US" dirty="0"/>
+              <a:t> « partial », </a:t>
+            </a:r>
+            <a:r>
+              <a:rPr lang="en-US" dirty="0" err="1"/>
+              <a:t>mais</a:t>
+            </a:r>
+            <a:r>
+              <a:rPr lang="en-US" dirty="0"/>
+              <a:t> </a:t>
+            </a:r>
+            <a:r>
+              <a:rPr lang="en-US" dirty="0" err="1"/>
+              <a:t>c’est</a:t>
+            </a:r>
+            <a:r>
+              <a:rPr lang="en-US" dirty="0"/>
+              <a:t> </a:t>
+            </a:r>
+            <a:r>
+              <a:rPr lang="en-US" dirty="0" err="1"/>
+              <a:t>rarement</a:t>
+            </a:r>
+            <a:r>
+              <a:rPr lang="en-US" dirty="0"/>
+              <a:t> </a:t>
+            </a:r>
+            <a:r>
+              <a:rPr lang="en-US" dirty="0" err="1"/>
+              <a:t>utilisé</a:t>
+            </a:r>
+            <a:r>
+              <a:rPr lang="en-US" dirty="0"/>
+              <a:t>, et à </a:t>
+            </a:r>
+            <a:r>
+              <a:rPr lang="en-US" dirty="0" err="1"/>
+              <a:t>éviter</a:t>
+            </a:r>
+            <a:r>
+              <a:rPr lang="en-US" dirty="0"/>
+              <a:t>.</a:t>
+            </a:r>
+            <a:endParaRPr lang="fr-FR" dirty="0"/>
+          </a:p>
+          <a:p>
+            <a:r>
+              <a:rPr lang="fr-FR" dirty="0"/>
+              <a:t>Un projet définit un namespace racine (souvent, le nom de l’application)</a:t>
+            </a:r>
+          </a:p>
+          <a:p>
+            <a:r>
+              <a:rPr lang="fr-FR" dirty="0"/>
+              <a:t>A chaque dossier contenant des fichiers compilés correspond un sous-namespace qui contient le même nom</a:t>
+            </a:r>
+          </a:p>
+          <a:p>
+            <a:endParaRPr lang="fr-FR" dirty="0"/>
+          </a:p>
+          <a:p>
+            <a:r>
+              <a:rPr lang="fr-FR" dirty="0"/>
+              <a:t>Visual Studio vous aidera sur toutes ces opérations.</a:t>
+            </a:r>
+          </a:p>
+        </p:txBody>
+      </p:sp>
+      <p:sp>
+        <p:nvSpPr>
+          <p:cNvPr id="4" name="Espace réservé du numéro de diapositive 3">
+            <a:extLst>
+              <a:ext uri="{FF2B5EF4-FFF2-40B4-BE49-F238E27FC236}">
+                <a16:creationId xmlns:a16="http://schemas.microsoft.com/office/drawing/2014/main" id="{0B6A5EC2-52AA-402F-BF35-2FA8E1FE6066}"/>
+              </a:ext>
+            </a:extLst>
+          </p:cNvPr>
+          <p:cNvSpPr>
+            <a:spLocks noGrp="1"/>
+          </p:cNvSpPr>
+          <p:nvPr>
+            <p:ph type="sldNum" sz="quarter" idx="12"/>
+          </p:nvPr>
+        </p:nvSpPr>
+        <p:spPr/>
+        <p:txBody>
+          <a:bodyPr/>
+          <a:lstStyle/>
+          <a:p>
+            <a:fld id="{C4488D40-6A2B-42CD-9565-99D41B29C2DA}" type="slidenum">
+              <a:rPr lang="fr-FR" smtClean="0"/>
+              <a:t>15</a:t>
+            </a:fld>
+            <a:endParaRPr lang="fr-FR"/>
+          </a:p>
+        </p:txBody>
+      </p:sp>
+    </p:spTree>
+    <p:extLst>
+      <p:ext uri="{BB962C8B-B14F-4D97-AF65-F5344CB8AC3E}">
+        <p14:creationId xmlns:p14="http://schemas.microsoft.com/office/powerpoint/2010/main" val="3523823991"/>
+      </p:ext>
+    </p:extLst>
+  </p:cSld>
+  <p:clrMapOvr>
+    <a:masterClrMapping/>
+  </p:clrMapOvr>
+</p:sld>
+</file>
+
+<file path=ppt/slides/slide16.xml><?xml version="1.0" encoding="utf-8"?>
+<p:sld xmlns:a="http://schemas.openxmlformats.org/drawingml/2006/main" xmlns:r="http://schemas.openxmlformats.org/officeDocument/2006/relationships" xmlns:p="http://schemas.openxmlformats.org/presentationml/2006/main">
+  <p:cSld>
+    <p:spTree>
+      <p:nvGrpSpPr>
+        <p:cNvPr id="1" name=""/>
+        <p:cNvGrpSpPr/>
+        <p:nvPr/>
+      </p:nvGrpSpPr>
+      <p:grpSpPr>
+        <a:xfrm>
+          <a:off x="0" y="0"/>
+          <a:ext cx="0" cy="0"/>
+          <a:chOff x="0" y="0"/>
+          <a:chExt cx="0" cy="0"/>
+        </a:xfrm>
+      </p:grpSpPr>
+      <p:sp>
+        <p:nvSpPr>
+          <p:cNvPr id="2" name="Titre 1">
+            <a:extLst>
+              <a:ext uri="{FF2B5EF4-FFF2-40B4-BE49-F238E27FC236}">
                 <a16:creationId xmlns:a16="http://schemas.microsoft.com/office/drawing/2014/main" id="{81448783-CF97-4916-8A8B-9408B79EAD34}"/>
               </a:ext>
             </a:extLst>
@@ -10890,7 +10782,7 @@
           <a:p>
             <a:fld id="{C4488D40-6A2B-42CD-9565-99D41B29C2DA}" type="slidenum">
               <a:rPr lang="fr-FR" smtClean="0"/>
-              <a:t>15</a:t>
+              <a:t>16</a:t>
             </a:fld>
             <a:endParaRPr lang="fr-FR"/>
           </a:p>
@@ -10958,6 +10850,169 @@
     <p:extLst>
       <p:ext uri="{BB962C8B-B14F-4D97-AF65-F5344CB8AC3E}">
         <p14:creationId xmlns:p14="http://schemas.microsoft.com/office/powerpoint/2010/main" val="4005064807"/>
+      </p:ext>
+    </p:extLst>
+  </p:cSld>
+  <p:clrMapOvr>
+    <a:masterClrMapping/>
+  </p:clrMapOvr>
+</p:sld>
+</file>
+
+<file path=ppt/slides/slide17.xml><?xml version="1.0" encoding="utf-8"?>
+<p:sld xmlns:a="http://schemas.openxmlformats.org/drawingml/2006/main" xmlns:r="http://schemas.openxmlformats.org/officeDocument/2006/relationships" xmlns:p="http://schemas.openxmlformats.org/presentationml/2006/main">
+  <p:cSld>
+    <p:spTree>
+      <p:nvGrpSpPr>
+        <p:cNvPr id="1" name=""/>
+        <p:cNvGrpSpPr/>
+        <p:nvPr/>
+      </p:nvGrpSpPr>
+      <p:grpSpPr>
+        <a:xfrm>
+          <a:off x="0" y="0"/>
+          <a:ext cx="0" cy="0"/>
+          <a:chOff x="0" y="0"/>
+          <a:chExt cx="0" cy="0"/>
+        </a:xfrm>
+      </p:grpSpPr>
+      <p:sp>
+        <p:nvSpPr>
+          <p:cNvPr id="2" name="Titre 1">
+            <a:extLst>
+              <a:ext uri="{FF2B5EF4-FFF2-40B4-BE49-F238E27FC236}">
+                <a16:creationId xmlns:a16="http://schemas.microsoft.com/office/drawing/2014/main" id="{19458EAE-9487-4EF1-8C0B-0CBC3C41DCAB}"/>
+              </a:ext>
+            </a:extLst>
+          </p:cNvPr>
+          <p:cNvSpPr>
+            <a:spLocks noGrp="1"/>
+          </p:cNvSpPr>
+          <p:nvPr>
+            <p:ph type="title"/>
+          </p:nvPr>
+        </p:nvSpPr>
+        <p:spPr/>
+        <p:txBody>
+          <a:bodyPr/>
+          <a:lstStyle/>
+          <a:p>
+            <a:r>
+              <a:rPr lang="fr-FR" dirty="0"/>
+              <a:t>Références - </a:t>
+            </a:r>
+            <a:r>
+              <a:rPr lang="fr-FR" dirty="0" err="1"/>
+              <a:t>Examples</a:t>
+            </a:r>
+            <a:endParaRPr lang="fr-FR" dirty="0"/>
+          </a:p>
+        </p:txBody>
+      </p:sp>
+      <p:sp>
+        <p:nvSpPr>
+          <p:cNvPr id="3" name="Espace réservé du contenu 2">
+            <a:extLst>
+              <a:ext uri="{FF2B5EF4-FFF2-40B4-BE49-F238E27FC236}">
+                <a16:creationId xmlns:a16="http://schemas.microsoft.com/office/drawing/2014/main" id="{D17273D5-DAB7-4CDD-A878-632B1F30B568}"/>
+              </a:ext>
+            </a:extLst>
+          </p:cNvPr>
+          <p:cNvSpPr>
+            <a:spLocks noGrp="1"/>
+          </p:cNvSpPr>
+          <p:nvPr>
+            <p:ph idx="1"/>
+          </p:nvPr>
+        </p:nvSpPr>
+        <p:spPr/>
+        <p:txBody>
+          <a:bodyPr/>
+          <a:lstStyle/>
+          <a:p>
+            <a:r>
+              <a:rPr lang="fr-FR" dirty="0"/>
+              <a:t>Dans un nouveau projet console, installez les packages suivants :</a:t>
+            </a:r>
+          </a:p>
+          <a:p>
+            <a:pPr lvl="1"/>
+            <a:r>
+              <a:rPr lang="fr-FR" dirty="0" err="1"/>
+              <a:t>Selenium.WebDriver</a:t>
+            </a:r>
+            <a:endParaRPr lang="fr-FR" dirty="0"/>
+          </a:p>
+          <a:p>
+            <a:pPr lvl="1"/>
+            <a:r>
+              <a:rPr lang="fr-FR" dirty="0" err="1"/>
+              <a:t>Selenium.Firefox.WebDriver</a:t>
+            </a:r>
+            <a:r>
+              <a:rPr lang="fr-FR" dirty="0"/>
+              <a:t> </a:t>
+            </a:r>
+          </a:p>
+          <a:p>
+            <a:r>
+              <a:rPr lang="fr-FR" dirty="0"/>
+              <a:t>Puis reprenez le code « </a:t>
+            </a:r>
+            <a:r>
+              <a:rPr lang="fr-FR" dirty="0" err="1"/>
+              <a:t>Selenium</a:t>
+            </a:r>
+            <a:r>
+              <a:rPr lang="fr-FR"/>
+              <a:t> » partagé</a:t>
+            </a:r>
+            <a:r>
+              <a:rPr lang="fr-FR" dirty="0"/>
+              <a:t>.</a:t>
+            </a:r>
+          </a:p>
+          <a:p>
+            <a:r>
+              <a:rPr lang="fr-FR" dirty="0"/>
+              <a:t>Lancez le programme, observez ce qu’il se passe.</a:t>
+            </a:r>
+          </a:p>
+        </p:txBody>
+      </p:sp>
+      <p:sp>
+        <p:nvSpPr>
+          <p:cNvPr id="4" name="Espace réservé du numéro de diapositive 3">
+            <a:extLst>
+              <a:ext uri="{FF2B5EF4-FFF2-40B4-BE49-F238E27FC236}">
+                <a16:creationId xmlns:a16="http://schemas.microsoft.com/office/drawing/2014/main" id="{1BA853F7-316C-46CF-B916-D3B800D811DE}"/>
+              </a:ext>
+            </a:extLst>
+          </p:cNvPr>
+          <p:cNvSpPr>
+            <a:spLocks noGrp="1"/>
+          </p:cNvSpPr>
+          <p:nvPr>
+            <p:ph type="sldNum" sz="quarter" idx="12"/>
+          </p:nvPr>
+        </p:nvSpPr>
+        <p:spPr/>
+        <p:txBody>
+          <a:bodyPr/>
+          <a:lstStyle/>
+          <a:p>
+            <a:fld id="{C4488D40-6A2B-42CD-9565-99D41B29C2DA}" type="slidenum">
+              <a:rPr lang="fr-FR" smtClean="0"/>
+              <a:t>17</a:t>
+            </a:fld>
+            <a:endParaRPr lang="fr-FR"/>
+          </a:p>
+        </p:txBody>
+      </p:sp>
+    </p:spTree>
+    <p:extLst>
+      <p:ext uri="{BB962C8B-B14F-4D97-AF65-F5344CB8AC3E}">
+        <p14:creationId xmlns:p14="http://schemas.microsoft.com/office/powerpoint/2010/main" val="3888673825"/>
       </p:ext>
     </p:extLst>
   </p:cSld>
@@ -13042,10 +13097,9 @@
           <a:lstStyle/>
           <a:p>
             <a:r>
-              <a:rPr lang="fr-FR" dirty="0" err="1"/>
-              <a:t>Accessbilités</a:t>
-            </a:r>
-            <a:endParaRPr lang="fr-FR" dirty="0"/>
+              <a:rPr lang="fr-FR" dirty="0"/>
+              <a:t>Accessibilités</a:t>
+            </a:r>
           </a:p>
         </p:txBody>
       </p:sp>
@@ -14419,7 +14473,52 @@
           <a:bodyPr/>
           <a:lstStyle/>
           <a:p>
-            <a:endParaRPr lang="fr-FR"/>
+            <a:r>
+              <a:rPr lang="fr-FR" dirty="0"/>
+              <a:t>Reprenez les différentes classes qui ont été développées jusque là, puis mettez en place une gestion pertinente de l’accessibilité.</a:t>
+            </a:r>
+          </a:p>
+          <a:p>
+            <a:pPr lvl="1"/>
+            <a:r>
+              <a:rPr lang="fr-FR" dirty="0"/>
+              <a:t>Pour chaque « membre » (champs, méthode, classe etc.), réfléchissez à sa portée et utilisez le mot clé adéquat</a:t>
+            </a:r>
+          </a:p>
+          <a:p>
+            <a:pPr lvl="1"/>
+            <a:r>
+              <a:rPr lang="fr-FR" dirty="0"/>
+              <a:t>Mettez en place les propriétés pour cacher l’accès aux variables internes, en rajoutant des éventuelles règles métier</a:t>
+            </a:r>
+          </a:p>
+          <a:p>
+            <a:pPr lvl="2"/>
+            <a:r>
+              <a:rPr lang="fr-FR" dirty="0"/>
+              <a:t>Exemple : il devrait être interdit d’affecter la valeur « 0 » à l’opérande de droite d’une division</a:t>
+            </a:r>
+          </a:p>
+          <a:p>
+            <a:pPr lvl="1"/>
+            <a:r>
+              <a:rPr lang="fr-FR" dirty="0"/>
+              <a:t>Et comme précédemment, réfléchissez aux constructeurs que vous exposez</a:t>
+            </a:r>
+          </a:p>
+          <a:p>
+            <a:pPr lvl="1"/>
+            <a:r>
+              <a:rPr lang="fr-FR" dirty="0"/>
+              <a:t>A la fin, en tant qu’utilisateur de vos classes, nous ne devez pouvoir manipuler que le stricte minimum de variables et méthodes.</a:t>
+            </a:r>
+          </a:p>
+          <a:p>
+            <a:pPr lvl="2"/>
+            <a:r>
+              <a:rPr lang="fr-FR" i="1" dirty="0"/>
+              <a:t>Avec un peu d’expérience, et en continuant de mettre en place ces bonnes pratiques, comme tout développeur .Net, vous acquerrez une certaine intuition du fonctionnement des classes que vous manipulerez simplement en analysant les accès que l’on vous aura laissé.</a:t>
+            </a:r>
           </a:p>
         </p:txBody>
       </p:sp>

</xml_diff>